<commit_message>
Add intro + algorithms
</commit_message>
<xml_diff>
--- a/Lecture_basics.pptx
+++ b/Lecture_basics.pptx
@@ -15,6 +15,9 @@
     <p:sldId id="263" r:id="rId9"/>
     <p:sldId id="264" r:id="rId10"/>
     <p:sldId id="265" r:id="rId11"/>
+    <p:sldId id="266" r:id="rId12"/>
+    <p:sldId id="267" r:id="rId13"/>
+    <p:sldId id="268" r:id="rId14"/>
   </p:sldIdLst>
   <p:sldSz cx="12192000" cy="6858000"/>
   <p:notesSz cx="6858000" cy="9144000"/>
@@ -114,6 +117,27 @@
     </a:lvl9pPr>
   </p:defaultTextStyle>
   <p:extLst>
+    <p:ext uri="{521415D9-36F7-43E2-AB2F-B90AF26B5E84}">
+      <p14:sectionLst xmlns:p14="http://schemas.microsoft.com/office/powerpoint/2010/main">
+        <p14:section name="Default Section" id="{1C83EB31-F33E-4E8E-9C73-AF4C42444994}">
+          <p14:sldIdLst>
+            <p14:sldId id="256"/>
+            <p14:sldId id="257"/>
+            <p14:sldId id="258"/>
+            <p14:sldId id="259"/>
+            <p14:sldId id="260"/>
+            <p14:sldId id="261"/>
+            <p14:sldId id="262"/>
+            <p14:sldId id="263"/>
+            <p14:sldId id="264"/>
+            <p14:sldId id="265"/>
+            <p14:sldId id="266"/>
+            <p14:sldId id="267"/>
+            <p14:sldId id="268"/>
+          </p14:sldIdLst>
+        </p14:section>
+      </p14:sectionLst>
+    </p:ext>
     <p:ext uri="{EFAFB233-063F-42B5-8137-9DF3F51BA10A}">
       <p15:sldGuideLst xmlns:p15="http://schemas.microsoft.com/office/powerpoint/2012/main"/>
     </p:ext>
@@ -252,7 +276,7 @@
           <a:p>
             <a:fld id="{229A6CE3-900D-4DAD-B42F-A2C3D8850D4D}" type="datetimeFigureOut">
               <a:rPr lang="en-CA" smtClean="0"/>
-              <a:t>2019-08-15</a:t>
+              <a:t>2019-08-18</a:t>
             </a:fld>
             <a:endParaRPr lang="en-CA"/>
           </a:p>
@@ -422,7 +446,7 @@
           <a:p>
             <a:fld id="{229A6CE3-900D-4DAD-B42F-A2C3D8850D4D}" type="datetimeFigureOut">
               <a:rPr lang="en-CA" smtClean="0"/>
-              <a:t>2019-08-15</a:t>
+              <a:t>2019-08-18</a:t>
             </a:fld>
             <a:endParaRPr lang="en-CA"/>
           </a:p>
@@ -602,7 +626,7 @@
           <a:p>
             <a:fld id="{229A6CE3-900D-4DAD-B42F-A2C3D8850D4D}" type="datetimeFigureOut">
               <a:rPr lang="en-CA" smtClean="0"/>
-              <a:t>2019-08-15</a:t>
+              <a:t>2019-08-18</a:t>
             </a:fld>
             <a:endParaRPr lang="en-CA"/>
           </a:p>
@@ -772,7 +796,7 @@
           <a:p>
             <a:fld id="{229A6CE3-900D-4DAD-B42F-A2C3D8850D4D}" type="datetimeFigureOut">
               <a:rPr lang="en-CA" smtClean="0"/>
-              <a:t>2019-08-15</a:t>
+              <a:t>2019-08-18</a:t>
             </a:fld>
             <a:endParaRPr lang="en-CA"/>
           </a:p>
@@ -1018,7 +1042,7 @@
           <a:p>
             <a:fld id="{229A6CE3-900D-4DAD-B42F-A2C3D8850D4D}" type="datetimeFigureOut">
               <a:rPr lang="en-CA" smtClean="0"/>
-              <a:t>2019-08-15</a:t>
+              <a:t>2019-08-18</a:t>
             </a:fld>
             <a:endParaRPr lang="en-CA"/>
           </a:p>
@@ -1250,7 +1274,7 @@
           <a:p>
             <a:fld id="{229A6CE3-900D-4DAD-B42F-A2C3D8850D4D}" type="datetimeFigureOut">
               <a:rPr lang="en-CA" smtClean="0"/>
-              <a:t>2019-08-15</a:t>
+              <a:t>2019-08-18</a:t>
             </a:fld>
             <a:endParaRPr lang="en-CA"/>
           </a:p>
@@ -1617,7 +1641,7 @@
           <a:p>
             <a:fld id="{229A6CE3-900D-4DAD-B42F-A2C3D8850D4D}" type="datetimeFigureOut">
               <a:rPr lang="en-CA" smtClean="0"/>
-              <a:t>2019-08-15</a:t>
+              <a:t>2019-08-18</a:t>
             </a:fld>
             <a:endParaRPr lang="en-CA"/>
           </a:p>
@@ -1735,7 +1759,7 @@
           <a:p>
             <a:fld id="{229A6CE3-900D-4DAD-B42F-A2C3D8850D4D}" type="datetimeFigureOut">
               <a:rPr lang="en-CA" smtClean="0"/>
-              <a:t>2019-08-15</a:t>
+              <a:t>2019-08-18</a:t>
             </a:fld>
             <a:endParaRPr lang="en-CA"/>
           </a:p>
@@ -1830,7 +1854,7 @@
           <a:p>
             <a:fld id="{229A6CE3-900D-4DAD-B42F-A2C3D8850D4D}" type="datetimeFigureOut">
               <a:rPr lang="en-CA" smtClean="0"/>
-              <a:t>2019-08-15</a:t>
+              <a:t>2019-08-18</a:t>
             </a:fld>
             <a:endParaRPr lang="en-CA"/>
           </a:p>
@@ -2107,7 +2131,7 @@
           <a:p>
             <a:fld id="{229A6CE3-900D-4DAD-B42F-A2C3D8850D4D}" type="datetimeFigureOut">
               <a:rPr lang="en-CA" smtClean="0"/>
-              <a:t>2019-08-15</a:t>
+              <a:t>2019-08-18</a:t>
             </a:fld>
             <a:endParaRPr lang="en-CA"/>
           </a:p>
@@ -2360,7 +2384,7 @@
           <a:p>
             <a:fld id="{229A6CE3-900D-4DAD-B42F-A2C3D8850D4D}" type="datetimeFigureOut">
               <a:rPr lang="en-CA" smtClean="0"/>
-              <a:t>2019-08-15</a:t>
+              <a:t>2019-08-18</a:t>
             </a:fld>
             <a:endParaRPr lang="en-CA"/>
           </a:p>
@@ -2573,7 +2597,7 @@
           <a:p>
             <a:fld id="{229A6CE3-900D-4DAD-B42F-A2C3D8850D4D}" type="datetimeFigureOut">
               <a:rPr lang="en-CA" smtClean="0"/>
-              <a:t>2019-08-15</a:t>
+              <a:t>2019-08-18</a:t>
             </a:fld>
             <a:endParaRPr lang="en-CA"/>
           </a:p>
@@ -3165,6 +3189,337 @@
 </p:sld>
 </file>
 
+<file path=ppt/slides/slide11.xml><?xml version="1.0" encoding="utf-8"?>
+<p:sld xmlns:a="http://schemas.openxmlformats.org/drawingml/2006/main" xmlns:r="http://schemas.openxmlformats.org/officeDocument/2006/relationships" xmlns:p="http://schemas.openxmlformats.org/presentationml/2006/main">
+  <p:cSld>
+    <p:spTree>
+      <p:nvGrpSpPr>
+        <p:cNvPr id="1" name=""/>
+        <p:cNvGrpSpPr/>
+        <p:nvPr/>
+      </p:nvGrpSpPr>
+      <p:grpSpPr>
+        <a:xfrm>
+          <a:off x="0" y="0"/>
+          <a:ext cx="0" cy="0"/>
+          <a:chOff x="0" y="0"/>
+          <a:chExt cx="0" cy="0"/>
+        </a:xfrm>
+      </p:grpSpPr>
+      <p:sp>
+        <p:nvSpPr>
+          <p:cNvPr id="2" name="Title 1"/>
+          <p:cNvSpPr>
+            <a:spLocks noGrp="1"/>
+          </p:cNvSpPr>
+          <p:nvPr>
+            <p:ph type="title"/>
+          </p:nvPr>
+        </p:nvSpPr>
+        <p:spPr/>
+        <p:txBody>
+          <a:bodyPr/>
+          <a:lstStyle/>
+          <a:p>
+            <a:r>
+              <a:rPr lang="en-CA" dirty="0" smtClean="0"/>
+              <a:t>Likelihood principle</a:t>
+            </a:r>
+            <a:endParaRPr lang="en-CA" dirty="0"/>
+          </a:p>
+        </p:txBody>
+      </p:sp>
+      <p:sp>
+        <p:nvSpPr>
+          <p:cNvPr id="3" name="Content Placeholder 2"/>
+          <p:cNvSpPr>
+            <a:spLocks noGrp="1"/>
+          </p:cNvSpPr>
+          <p:nvPr>
+            <p:ph idx="1"/>
+          </p:nvPr>
+        </p:nvSpPr>
+        <p:spPr/>
+        <p:txBody>
+          <a:bodyPr/>
+          <a:lstStyle/>
+          <a:p>
+            <a:r>
+              <a:rPr lang="en-CA" dirty="0">
+                <a:hlinkClick r:id="rId2"/>
+              </a:rPr>
+              <a:t>https://en.wikipedia.org/wiki/Likelihood_principle</a:t>
+            </a:r>
+            <a:endParaRPr lang="en-CA" dirty="0"/>
+          </a:p>
+        </p:txBody>
+      </p:sp>
+    </p:spTree>
+    <p:extLst>
+      <p:ext uri="{BB962C8B-B14F-4D97-AF65-F5344CB8AC3E}">
+        <p14:creationId xmlns:p14="http://schemas.microsoft.com/office/powerpoint/2010/main" val="3223794644"/>
+      </p:ext>
+    </p:extLst>
+  </p:cSld>
+  <p:clrMapOvr>
+    <a:masterClrMapping/>
+  </p:clrMapOvr>
+  <p:timing>
+    <p:tnLst>
+      <p:par>
+        <p:cTn id="1" dur="indefinite" restart="never" nodeType="tmRoot"/>
+      </p:par>
+    </p:tnLst>
+  </p:timing>
+</p:sld>
+</file>
+
+<file path=ppt/slides/slide12.xml><?xml version="1.0" encoding="utf-8"?>
+<p:sld xmlns:a="http://schemas.openxmlformats.org/drawingml/2006/main" xmlns:r="http://schemas.openxmlformats.org/officeDocument/2006/relationships" xmlns:p="http://schemas.openxmlformats.org/presentationml/2006/main">
+  <p:cSld>
+    <p:spTree>
+      <p:nvGrpSpPr>
+        <p:cNvPr id="1" name=""/>
+        <p:cNvGrpSpPr/>
+        <p:nvPr/>
+      </p:nvGrpSpPr>
+      <p:grpSpPr>
+        <a:xfrm>
+          <a:off x="0" y="0"/>
+          <a:ext cx="0" cy="0"/>
+          <a:chOff x="0" y="0"/>
+          <a:chExt cx="0" cy="0"/>
+        </a:xfrm>
+      </p:grpSpPr>
+      <p:sp>
+        <p:nvSpPr>
+          <p:cNvPr id="2" name="Title 1"/>
+          <p:cNvSpPr>
+            <a:spLocks noGrp="1"/>
+          </p:cNvSpPr>
+          <p:nvPr>
+            <p:ph type="title"/>
+          </p:nvPr>
+        </p:nvSpPr>
+        <p:spPr/>
+        <p:txBody>
+          <a:bodyPr/>
+          <a:lstStyle/>
+          <a:p>
+            <a:r>
+              <a:rPr lang="en-CA" dirty="0" smtClean="0"/>
+              <a:t>Prosecutor’s fallacy</a:t>
+            </a:r>
+            <a:endParaRPr lang="en-CA" dirty="0"/>
+          </a:p>
+        </p:txBody>
+      </p:sp>
+      <p:sp>
+        <p:nvSpPr>
+          <p:cNvPr id="3" name="Content Placeholder 2"/>
+          <p:cNvSpPr>
+            <a:spLocks noGrp="1"/>
+          </p:cNvSpPr>
+          <p:nvPr>
+            <p:ph idx="1"/>
+          </p:nvPr>
+        </p:nvSpPr>
+        <p:spPr/>
+        <p:txBody>
+          <a:bodyPr/>
+          <a:lstStyle/>
+          <a:p>
+            <a:r>
+              <a:rPr lang="en-CA" dirty="0"/>
+              <a:t>Attempting to interpret the likelihood of a hypothesis given observed evidence as the probability of the hypothesis is a common error, with potentially disastrous consequences in medicine, engineering or jurisprudence. See </a:t>
+            </a:r>
+            <a:r>
+              <a:rPr lang="en-CA" dirty="0">
+                <a:hlinkClick r:id="rId2" tooltip="Prosecutor's fallacy"/>
+              </a:rPr>
+              <a:t>prosecutor's fallacy</a:t>
+            </a:r>
+            <a:r>
+              <a:rPr lang="en-CA" dirty="0"/>
+              <a:t> for an example of this</a:t>
+            </a:r>
+            <a:r>
+              <a:rPr lang="en-CA" dirty="0" smtClean="0"/>
+              <a:t>.</a:t>
+            </a:r>
+          </a:p>
+          <a:p>
+            <a:r>
+              <a:rPr lang="en-CA" dirty="0">
+                <a:hlinkClick r:id="rId2"/>
+              </a:rPr>
+              <a:t>https://</a:t>
+            </a:r>
+            <a:r>
+              <a:rPr lang="en-CA" dirty="0" smtClean="0">
+                <a:hlinkClick r:id="rId2"/>
+              </a:rPr>
+              <a:t>en.wikipedia.org/wiki/Prosecutor%27s_fallacy</a:t>
+            </a:r>
+            <a:endParaRPr lang="en-CA" dirty="0" smtClean="0"/>
+          </a:p>
+          <a:p>
+            <a:r>
+              <a:rPr lang="en-CA" dirty="0" smtClean="0"/>
+              <a:t>The ordinary least squares method maximizes the likelihood of the </a:t>
+            </a:r>
+            <a:r>
+              <a:rPr lang="en-CA" smtClean="0"/>
+              <a:t>linear regression model</a:t>
+            </a:r>
+            <a:endParaRPr lang="en-CA" dirty="0"/>
+          </a:p>
+        </p:txBody>
+      </p:sp>
+    </p:spTree>
+    <p:extLst>
+      <p:ext uri="{BB962C8B-B14F-4D97-AF65-F5344CB8AC3E}">
+        <p14:creationId xmlns:p14="http://schemas.microsoft.com/office/powerpoint/2010/main" val="1007912892"/>
+      </p:ext>
+    </p:extLst>
+  </p:cSld>
+  <p:clrMapOvr>
+    <a:masterClrMapping/>
+  </p:clrMapOvr>
+  <p:timing>
+    <p:tnLst>
+      <p:par>
+        <p:cTn id="1" dur="indefinite" restart="never" nodeType="tmRoot"/>
+      </p:par>
+    </p:tnLst>
+  </p:timing>
+</p:sld>
+</file>
+
+<file path=ppt/slides/slide13.xml><?xml version="1.0" encoding="utf-8"?>
+<p:sld xmlns:a="http://schemas.openxmlformats.org/drawingml/2006/main" xmlns:r="http://schemas.openxmlformats.org/officeDocument/2006/relationships" xmlns:p="http://schemas.openxmlformats.org/presentationml/2006/main">
+  <p:cSld>
+    <p:spTree>
+      <p:nvGrpSpPr>
+        <p:cNvPr id="1" name=""/>
+        <p:cNvGrpSpPr/>
+        <p:nvPr/>
+      </p:nvGrpSpPr>
+      <p:grpSpPr>
+        <a:xfrm>
+          <a:off x="0" y="0"/>
+          <a:ext cx="0" cy="0"/>
+          <a:chOff x="0" y="0"/>
+          <a:chExt cx="0" cy="0"/>
+        </a:xfrm>
+      </p:grpSpPr>
+      <p:sp>
+        <p:nvSpPr>
+          <p:cNvPr id="2" name="Title 1"/>
+          <p:cNvSpPr>
+            <a:spLocks noGrp="1"/>
+          </p:cNvSpPr>
+          <p:nvPr>
+            <p:ph type="title"/>
+          </p:nvPr>
+        </p:nvSpPr>
+        <p:spPr/>
+        <p:txBody>
+          <a:bodyPr/>
+          <a:lstStyle/>
+          <a:p>
+            <a:r>
+              <a:rPr lang="en-CA" dirty="0" smtClean="0"/>
+              <a:t>Beta distribution	</a:t>
+            </a:r>
+            <a:endParaRPr lang="en-CA" dirty="0"/>
+          </a:p>
+        </p:txBody>
+      </p:sp>
+      <p:sp>
+        <p:nvSpPr>
+          <p:cNvPr id="3" name="Content Placeholder 2"/>
+          <p:cNvSpPr>
+            <a:spLocks noGrp="1"/>
+          </p:cNvSpPr>
+          <p:nvPr>
+            <p:ph idx="1"/>
+          </p:nvPr>
+        </p:nvSpPr>
+        <p:spPr/>
+        <p:txBody>
+          <a:bodyPr/>
+          <a:lstStyle/>
+          <a:p>
+            <a:r>
+              <a:rPr lang="en-CA" dirty="0">
+                <a:hlinkClick r:id="rId2"/>
+              </a:rPr>
+              <a:t>https://</a:t>
+            </a:r>
+            <a:r>
+              <a:rPr lang="en-CA" dirty="0" smtClean="0">
+                <a:hlinkClick r:id="rId2"/>
+              </a:rPr>
+              <a:t>stats.stackexchange.com/questions/47771/what-is-the-intuition-behind-beta-distribution</a:t>
+            </a:r>
+            <a:endParaRPr lang="en-CA" dirty="0" smtClean="0"/>
+          </a:p>
+          <a:p>
+            <a:pPr fontAlgn="base"/>
+            <a:r>
+              <a:rPr lang="en-CA" dirty="0"/>
+              <a:t>T</a:t>
+            </a:r>
+            <a:r>
+              <a:rPr lang="en-CA" dirty="0" smtClean="0"/>
+              <a:t>he </a:t>
+            </a:r>
+            <a:r>
+              <a:rPr lang="en-CA" dirty="0"/>
+              <a:t>Beta distribution is best for representing a probabilistic distribution </a:t>
+            </a:r>
+            <a:r>
+              <a:rPr lang="en-CA" i="1" dirty="0"/>
+              <a:t>of probabilities</a:t>
+            </a:r>
+            <a:r>
+              <a:rPr lang="en-CA" dirty="0"/>
+              <a:t>- the case where we don't know what a probability is in advance, but we have some reasonable guesses.</a:t>
+            </a:r>
+          </a:p>
+          <a:p>
+            <a:r>
+              <a:rPr lang="en-CA" dirty="0"/>
+              <a:t/>
+            </a:r>
+            <a:br>
+              <a:rPr lang="en-CA" dirty="0"/>
+            </a:br>
+            <a:endParaRPr lang="en-CA" dirty="0"/>
+          </a:p>
+        </p:txBody>
+      </p:sp>
+    </p:spTree>
+    <p:extLst>
+      <p:ext uri="{BB962C8B-B14F-4D97-AF65-F5344CB8AC3E}">
+        <p14:creationId xmlns:p14="http://schemas.microsoft.com/office/powerpoint/2010/main" val="2314451852"/>
+      </p:ext>
+    </p:extLst>
+  </p:cSld>
+  <p:clrMapOvr>
+    <a:masterClrMapping/>
+  </p:clrMapOvr>
+  <p:timing>
+    <p:tnLst>
+      <p:par>
+        <p:cTn id="1" dur="indefinite" restart="never" nodeType="tmRoot"/>
+      </p:par>
+    </p:tnLst>
+  </p:timing>
+</p:sld>
+</file>
+
 <file path=ppt/slides/slide2.xml><?xml version="1.0" encoding="utf-8"?>
 <p:sld xmlns:a="http://schemas.openxmlformats.org/drawingml/2006/main" xmlns:r="http://schemas.openxmlformats.org/officeDocument/2006/relationships" xmlns:p="http://schemas.openxmlformats.org/presentationml/2006/main">
   <p:cSld>
@@ -3329,6 +3684,13 @@
   <p:clrMapOvr>
     <a:masterClrMapping/>
   </p:clrMapOvr>
+  <p:timing>
+    <p:tnLst>
+      <p:par>
+        <p:cTn id="1" dur="indefinite" restart="never" nodeType="tmRoot"/>
+      </p:par>
+    </p:tnLst>
+  </p:timing>
 </p:sld>
 </file>
 
@@ -3463,6 +3825,13 @@
   <p:clrMapOvr>
     <a:masterClrMapping/>
   </p:clrMapOvr>
+  <p:timing>
+    <p:tnLst>
+      <p:par>
+        <p:cTn id="1" dur="indefinite" restart="never" nodeType="tmRoot"/>
+      </p:par>
+    </p:tnLst>
+  </p:timing>
 </p:sld>
 </file>
 
@@ -3587,6 +3956,13 @@
   <p:clrMapOvr>
     <a:masterClrMapping/>
   </p:clrMapOvr>
+  <p:timing>
+    <p:tnLst>
+      <p:par>
+        <p:cTn id="1" dur="indefinite" restart="never" nodeType="tmRoot"/>
+      </p:par>
+    </p:tnLst>
+  </p:timing>
 </p:sld>
 </file>
 

</xml_diff>